<commit_message>
Adding updated model flow chart
</commit_message>
<xml_diff>
--- a/Model/ML_model_final.pptx
+++ b/Model/ML_model_final.pptx
@@ -121,6 +121,91 @@
     </p:ext>
   </p:extLst>
 </p:presentation>
+</file>
+
+<file path=ppt/changesInfos/changesInfo1.xml><?xml version="1.0" encoding="utf-8"?>
+<pc:chgInfo xmlns:a="http://schemas.openxmlformats.org/drawingml/2006/main" xmlns:r="http://schemas.openxmlformats.org/officeDocument/2006/relationships" xmlns:ac="http://schemas.microsoft.com/office/drawing/2013/main/command" xmlns:pc="http://schemas.microsoft.com/office/powerpoint/2013/main/command">
+  <pc:docChgLst>
+    <pc:chgData name="Josh Stephens" userId="3c9335bfab62eb48" providerId="LiveId" clId="{23919E6F-F1FF-47C2-A6A9-F11EDC15CC19}"/>
+    <pc:docChg chg="custSel modSld">
+      <pc:chgData name="Josh Stephens" userId="3c9335bfab62eb48" providerId="LiveId" clId="{23919E6F-F1FF-47C2-A6A9-F11EDC15CC19}" dt="2021-10-05T18:10:58.515" v="41" actId="20577"/>
+      <pc:docMkLst>
+        <pc:docMk/>
+      </pc:docMkLst>
+      <pc:sldChg chg="addSp delSp modSp mod">
+        <pc:chgData name="Josh Stephens" userId="3c9335bfab62eb48" providerId="LiveId" clId="{23919E6F-F1FF-47C2-A6A9-F11EDC15CC19}" dt="2021-10-05T18:10:58.515" v="41" actId="20577"/>
+        <pc:sldMkLst>
+          <pc:docMk/>
+          <pc:sldMk cId="0" sldId="338"/>
+        </pc:sldMkLst>
+        <pc:spChg chg="add mod">
+          <ac:chgData name="Josh Stephens" userId="3c9335bfab62eb48" providerId="LiveId" clId="{23919E6F-F1FF-47C2-A6A9-F11EDC15CC19}" dt="2021-10-05T18:10:48.855" v="38" actId="20577"/>
+          <ac:spMkLst>
+            <pc:docMk/>
+            <pc:sldMk cId="0" sldId="338"/>
+            <ac:spMk id="10" creationId="{5999175C-24CF-451F-AC54-B140DE8BC353}"/>
+          </ac:spMkLst>
+        </pc:spChg>
+        <pc:spChg chg="mod">
+          <ac:chgData name="Josh Stephens" userId="3c9335bfab62eb48" providerId="LiveId" clId="{23919E6F-F1FF-47C2-A6A9-F11EDC15CC19}" dt="2021-10-05T18:10:24.901" v="34" actId="20577"/>
+          <ac:spMkLst>
+            <pc:docMk/>
+            <pc:sldMk cId="0" sldId="338"/>
+            <ac:spMk id="35" creationId="{1A28D117-B2EF-4EAE-BDC9-DA64D3400901}"/>
+          </ac:spMkLst>
+        </pc:spChg>
+        <pc:spChg chg="mod">
+          <ac:chgData name="Josh Stephens" userId="3c9335bfab62eb48" providerId="LiveId" clId="{23919E6F-F1FF-47C2-A6A9-F11EDC15CC19}" dt="2021-10-05T18:10:37.216" v="36" actId="5793"/>
+          <ac:spMkLst>
+            <pc:docMk/>
+            <pc:sldMk cId="0" sldId="338"/>
+            <ac:spMk id="36" creationId="{03A13DAE-7D25-4782-824C-E845C03D6C3D}"/>
+          </ac:spMkLst>
+        </pc:spChg>
+        <pc:spChg chg="mod">
+          <ac:chgData name="Josh Stephens" userId="3c9335bfab62eb48" providerId="LiveId" clId="{23919E6F-F1FF-47C2-A6A9-F11EDC15CC19}" dt="2021-10-05T18:10:12.671" v="17" actId="20577"/>
+          <ac:spMkLst>
+            <pc:docMk/>
+            <pc:sldMk cId="0" sldId="338"/>
+            <ac:spMk id="37" creationId="{09D1B5C0-A338-490B-B947-11087FCB5C0C}"/>
+          </ac:spMkLst>
+        </pc:spChg>
+        <pc:spChg chg="mod">
+          <ac:chgData name="Josh Stephens" userId="3c9335bfab62eb48" providerId="LiveId" clId="{23919E6F-F1FF-47C2-A6A9-F11EDC15CC19}" dt="2021-10-05T18:10:18.406" v="18"/>
+          <ac:spMkLst>
+            <pc:docMk/>
+            <pc:sldMk cId="0" sldId="338"/>
+            <ac:spMk id="38" creationId="{D8B806D9-B05B-403B-8B86-525AD31CCE52}"/>
+          </ac:spMkLst>
+        </pc:spChg>
+        <pc:spChg chg="del mod">
+          <ac:chgData name="Josh Stephens" userId="3c9335bfab62eb48" providerId="LiveId" clId="{23919E6F-F1FF-47C2-A6A9-F11EDC15CC19}" dt="2021-10-05T18:10:56.677" v="40" actId="21"/>
+          <ac:spMkLst>
+            <pc:docMk/>
+            <pc:sldMk cId="0" sldId="338"/>
+            <ac:spMk id="39" creationId="{BAB99B19-274F-493D-A790-65C0DFE746DD}"/>
+          </ac:spMkLst>
+        </pc:spChg>
+        <pc:spChg chg="del">
+          <ac:chgData name="Josh Stephens" userId="3c9335bfab62eb48" providerId="LiveId" clId="{23919E6F-F1FF-47C2-A6A9-F11EDC15CC19}" dt="2021-10-05T18:10:46.761" v="37" actId="21"/>
+          <ac:spMkLst>
+            <pc:docMk/>
+            <pc:sldMk cId="0" sldId="338"/>
+            <ac:spMk id="40" creationId="{779E5519-1390-405A-9631-0260EF1394C0}"/>
+          </ac:spMkLst>
+        </pc:spChg>
+        <pc:spChg chg="add mod">
+          <ac:chgData name="Josh Stephens" userId="3c9335bfab62eb48" providerId="LiveId" clId="{23919E6F-F1FF-47C2-A6A9-F11EDC15CC19}" dt="2021-10-05T18:10:58.515" v="41" actId="20577"/>
+          <ac:spMkLst>
+            <pc:docMk/>
+            <pc:sldMk cId="0" sldId="338"/>
+            <ac:spMk id="41" creationId="{0DB39C0B-357B-4D1F-A895-283B6C0AD5E0}"/>
+          </ac:spMkLst>
+        </pc:spChg>
+      </pc:sldChg>
+    </pc:docChg>
+  </pc:docChgLst>
+</pc:chgInfo>
 </file>
 
 <file path=ppt/slideLayouts/slideLayout1.xml><?xml version="1.0" encoding="utf-8"?>
@@ -9377,7 +9462,7 @@
           <a:p>
             <a:fld id="{6EBB0E32-0304-4451-ADB8-C044457D5B85}" type="datetimeFigureOut">
               <a:rPr lang="en-US" smtClean="0"/>
-              <a:t>9/25/2021</a:t>
+              <a:t>10/5/2021</a:t>
             </a:fld>
             <a:endParaRPr lang="en-US"/>
           </a:p>
@@ -11099,7 +11184,7 @@
           <a:p>
             <a:r>
               <a:rPr lang="en-US" dirty="0"/>
-              <a:t>Output Predictions</a:t>
+              <a:t>City Predictions</a:t>
             </a:r>
           </a:p>
         </p:txBody>
@@ -11130,7 +11215,7 @@
             </a:pPr>
             <a:r>
               <a:rPr lang="en-US" sz="1200" dirty="0"/>
-              <a:t>• Use Mean Absolute Error and model output to create predicted range for each feature</a:t>
+              <a:t>•Create DataFrame for each city allowing customers to select ideal travel month</a:t>
             </a:r>
           </a:p>
         </p:txBody>
@@ -11158,7 +11243,7 @@
           <a:p>
             <a:r>
               <a:rPr lang="en-US" dirty="0"/>
-              <a:t>Plot predictions vs. data</a:t>
+              <a:t>Output Predictions</a:t>
             </a:r>
           </a:p>
         </p:txBody>
@@ -11184,72 +11269,12 @@
           <a:bodyPr/>
           <a:lstStyle/>
           <a:p>
-            <a:pPr algn="l"/>
+            <a:pPr marL="0" indent="0" algn="l">
+              <a:buNone/>
+            </a:pPr>
             <a:r>
               <a:rPr lang="en-US" sz="1200" dirty="0"/>
-              <a:t>•Output scatter plot of datapoints with prediction line</a:t>
-            </a:r>
-          </a:p>
-        </p:txBody>
-      </p:sp>
-      <p:sp>
-        <p:nvSpPr>
-          <p:cNvPr id="39" name="Text Placeholder 38">
-            <a:extLst>
-              <a:ext uri="{FF2B5EF4-FFF2-40B4-BE49-F238E27FC236}">
-                <a16:creationId xmlns:a16="http://schemas.microsoft.com/office/drawing/2014/main" id="{BAB99B19-274F-493D-A790-65C0DFE746DD}"/>
-              </a:ext>
-            </a:extLst>
-          </p:cNvPr>
-          <p:cNvSpPr>
-            <a:spLocks noGrp="1"/>
-          </p:cNvSpPr>
-          <p:nvPr>
-            <p:ph type="body" sz="quarter" idx="44"/>
-          </p:nvPr>
-        </p:nvSpPr>
-        <p:spPr>
-          <a:xfrm>
-            <a:off x="1681955" y="5340097"/>
-            <a:ext cx="1827689" cy="263161"/>
-          </a:xfrm>
-        </p:spPr>
-        <p:txBody>
-          <a:bodyPr/>
-          <a:lstStyle/>
-          <a:p>
-            <a:r>
-              <a:rPr lang="en-US" dirty="0"/>
-              <a:t>City Predictions</a:t>
-            </a:r>
-          </a:p>
-        </p:txBody>
-      </p:sp>
-      <p:sp>
-        <p:nvSpPr>
-          <p:cNvPr id="40" name="Text Placeholder 39">
-            <a:extLst>
-              <a:ext uri="{FF2B5EF4-FFF2-40B4-BE49-F238E27FC236}">
-                <a16:creationId xmlns:a16="http://schemas.microsoft.com/office/drawing/2014/main" id="{779E5519-1390-405A-9631-0260EF1394C0}"/>
-              </a:ext>
-            </a:extLst>
-          </p:cNvPr>
-          <p:cNvSpPr>
-            <a:spLocks noGrp="1"/>
-          </p:cNvSpPr>
-          <p:nvPr>
-            <p:ph type="body" sz="quarter" idx="45"/>
-          </p:nvPr>
-        </p:nvSpPr>
-        <p:spPr/>
-        <p:txBody>
-          <a:bodyPr/>
-          <a:lstStyle/>
-          <a:p>
-            <a:pPr algn="l"/>
-            <a:r>
-              <a:rPr lang="en-US" sz="1200" dirty="0"/>
-              <a:t>•Create DataFrame for each city allowing customers to select ideal travel month</a:t>
+              <a:t>• Use Mean Absolute Error and model output to create predicted range for each feature</a:t>
             </a:r>
           </a:p>
         </p:txBody>
@@ -11877,6 +11902,62 @@
           </a:p>
         </p:txBody>
       </p:sp>
+      <p:sp>
+        <p:nvSpPr>
+          <p:cNvPr id="10" name="Text Placeholder 9">
+            <a:extLst>
+              <a:ext uri="{FF2B5EF4-FFF2-40B4-BE49-F238E27FC236}">
+                <a16:creationId xmlns:a16="http://schemas.microsoft.com/office/drawing/2014/main" id="{5999175C-24CF-451F-AC54-B140DE8BC353}"/>
+              </a:ext>
+            </a:extLst>
+          </p:cNvPr>
+          <p:cNvSpPr>
+            <a:spLocks noGrp="1"/>
+          </p:cNvSpPr>
+          <p:nvPr>
+            <p:ph type="body" sz="quarter" idx="45"/>
+          </p:nvPr>
+        </p:nvSpPr>
+        <p:spPr/>
+        <p:txBody>
+          <a:bodyPr/>
+          <a:lstStyle/>
+          <a:p>
+            <a:r>
+              <a:rPr lang="en-US" dirty="0"/>
+              <a:t> </a:t>
+            </a:r>
+          </a:p>
+        </p:txBody>
+      </p:sp>
+      <p:sp>
+        <p:nvSpPr>
+          <p:cNvPr id="41" name="Text Placeholder 40">
+            <a:extLst>
+              <a:ext uri="{FF2B5EF4-FFF2-40B4-BE49-F238E27FC236}">
+                <a16:creationId xmlns:a16="http://schemas.microsoft.com/office/drawing/2014/main" id="{0DB39C0B-357B-4D1F-A895-283B6C0AD5E0}"/>
+              </a:ext>
+            </a:extLst>
+          </p:cNvPr>
+          <p:cNvSpPr>
+            <a:spLocks noGrp="1"/>
+          </p:cNvSpPr>
+          <p:nvPr>
+            <p:ph type="body" sz="quarter" idx="44"/>
+          </p:nvPr>
+        </p:nvSpPr>
+        <p:spPr/>
+        <p:txBody>
+          <a:bodyPr/>
+          <a:lstStyle/>
+          <a:p>
+            <a:r>
+              <a:rPr lang="en-US" dirty="0"/>
+              <a:t> </a:t>
+            </a:r>
+          </a:p>
+        </p:txBody>
+      </p:sp>
     </p:spTree>
   </p:cSld>
   <p:clrMapOvr>
@@ -12181,23 +12262,6 @@
 </file>
 
 <file path=customXml/item1.xml><?xml version="1.0" encoding="utf-8"?>
-<p:properties xmlns:p="http://schemas.microsoft.com/office/2006/metadata/properties" xmlns:xsi="http://www.w3.org/2001/XMLSchema-instance" xmlns:pc="http://schemas.microsoft.com/office/infopath/2007/PartnerControls">
-  <documentManagement>
-    <MediaServiceKeyPoints xmlns="71af3243-3dd4-4a8d-8c0d-dd76da1f02a5" xsi:nil="true"/>
-  </documentManagement>
-</p:properties>
-</file>
-
-<file path=customXml/item2.xml><?xml version="1.0" encoding="utf-8"?>
-<?mso-contentType ?>
-<FormTemplates xmlns="http://schemas.microsoft.com/sharepoint/v3/contenttype/forms">
-  <Display>DocumentLibraryForm</Display>
-  <Edit>DocumentLibraryForm</Edit>
-  <New>DocumentLibraryForm</New>
-</FormTemplates>
-</file>
-
-<file path=customXml/item3.xml><?xml version="1.0" encoding="utf-8"?>
 <ct:contentTypeSchema xmlns:ct="http://schemas.microsoft.com/office/2006/metadata/contentType" xmlns:ma="http://schemas.microsoft.com/office/2006/metadata/properties/metaAttributes" ct:_="" ma:_="" ma:contentTypeName="Document" ma:contentTypeID="0x01010079F111ED35F8CC479449609E8A0923A6" ma:contentTypeVersion="11" ma:contentTypeDescription="Create a new document." ma:contentTypeScope="" ma:versionID="96291512c1ee715ab617f4c07df79fc1">
   <xsd:schema xmlns:xsd="http://www.w3.org/2001/XMLSchema" xmlns:xs="http://www.w3.org/2001/XMLSchema" xmlns:p="http://schemas.microsoft.com/office/2006/metadata/properties" xmlns:ns2="71af3243-3dd4-4a8d-8c0d-dd76da1f02a5" xmlns:ns3="16c05727-aa75-4e4a-9b5f-8a80a1165891" targetNamespace="http://schemas.microsoft.com/office/2006/metadata/properties" ma:root="true" ma:fieldsID="8256c27c40ca5c40ce1cf6c44f0205df" ns2:_="" ns3:_="">
     <xsd:import namespace="71af3243-3dd4-4a8d-8c0d-dd76da1f02a5"/>
@@ -12408,25 +12472,24 @@
 </ct:contentTypeSchema>
 </file>
 
-<file path=customXml/itemProps1.xml><?xml version="1.0" encoding="utf-8"?>
-<ds:datastoreItem xmlns:ds="http://schemas.openxmlformats.org/officeDocument/2006/customXml" ds:itemID="{C490981D-72C4-476E-A6B5-70E1E6C7AD5E}">
-  <ds:schemaRefs>
-    <ds:schemaRef ds:uri="http://schemas.microsoft.com/office/2006/metadata/properties"/>
-    <ds:schemaRef ds:uri="http://schemas.microsoft.com/office/infopath/2007/PartnerControls"/>
-    <ds:schemaRef ds:uri="71af3243-3dd4-4a8d-8c0d-dd76da1f02a5"/>
-  </ds:schemaRefs>
-</ds:datastoreItem>
+<file path=customXml/item2.xml><?xml version="1.0" encoding="utf-8"?>
+<?mso-contentType ?>
+<FormTemplates xmlns="http://schemas.microsoft.com/sharepoint/v3/contenttype/forms">
+  <Display>DocumentLibraryForm</Display>
+  <Edit>DocumentLibraryForm</Edit>
+  <New>DocumentLibraryForm</New>
+</FormTemplates>
 </file>
 
-<file path=customXml/itemProps2.xml><?xml version="1.0" encoding="utf-8"?>
-<ds:datastoreItem xmlns:ds="http://schemas.openxmlformats.org/officeDocument/2006/customXml" ds:itemID="{35C5EB9D-7CF7-4BCF-B9A7-CEBF7BA0E775}">
-  <ds:schemaRefs>
-    <ds:schemaRef ds:uri="http://schemas.microsoft.com/sharepoint/v3/contenttype/forms"/>
-  </ds:schemaRefs>
-</ds:datastoreItem>
+<file path=customXml/item3.xml><?xml version="1.0" encoding="utf-8"?>
+<p:properties xmlns:p="http://schemas.microsoft.com/office/2006/metadata/properties" xmlns:xsi="http://www.w3.org/2001/XMLSchema-instance" xmlns:pc="http://schemas.microsoft.com/office/infopath/2007/PartnerControls">
+  <documentManagement>
+    <MediaServiceKeyPoints xmlns="71af3243-3dd4-4a8d-8c0d-dd76da1f02a5" xsi:nil="true"/>
+  </documentManagement>
+</p:properties>
 </file>
 
-<file path=customXml/itemProps3.xml><?xml version="1.0" encoding="utf-8"?>
+<file path=customXml/itemProps1.xml><?xml version="1.0" encoding="utf-8"?>
 <ds:datastoreItem xmlns:ds="http://schemas.openxmlformats.org/officeDocument/2006/customXml" ds:itemID="{B2097422-3948-4F6F-B390-CE733BA37D06}">
   <ds:schemaRefs>
     <ds:schemaRef ds:uri="http://schemas.microsoft.com/office/2006/metadata/contentType"/>
@@ -12443,4 +12506,22 @@
     <ds:schemaRef ds:uri="http://schemas.microsoft.com/internal/obd"/>
   </ds:schemaRefs>
 </ds:datastoreItem>
+</file>
+
+<file path=customXml/itemProps2.xml><?xml version="1.0" encoding="utf-8"?>
+<ds:datastoreItem xmlns:ds="http://schemas.openxmlformats.org/officeDocument/2006/customXml" ds:itemID="{35C5EB9D-7CF7-4BCF-B9A7-CEBF7BA0E775}">
+  <ds:schemaRefs>
+    <ds:schemaRef ds:uri="http://schemas.microsoft.com/sharepoint/v3/contenttype/forms"/>
+  </ds:schemaRefs>
+</ds:datastoreItem>
+</file>
+
+<file path=customXml/itemProps3.xml><?xml version="1.0" encoding="utf-8"?>
+<ds:datastoreItem xmlns:ds="http://schemas.openxmlformats.org/officeDocument/2006/customXml" ds:itemID="{C490981D-72C4-476E-A6B5-70E1E6C7AD5E}">
+  <ds:schemaRefs>
+    <ds:schemaRef ds:uri="http://schemas.microsoft.com/office/2006/metadata/properties"/>
+    <ds:schemaRef ds:uri="http://schemas.microsoft.com/office/infopath/2007/PartnerControls"/>
+    <ds:schemaRef ds:uri="71af3243-3dd4-4a8d-8c0d-dd76da1f02a5"/>
+  </ds:schemaRefs>
+</ds:datastoreItem>
 </file>
</xml_diff>